<commit_message>
Inicio exercicios semana 2
</commit_message>
<xml_diff>
--- a/PPT/PPT2_-_Regular_Expressions.pptx
+++ b/PPT/PPT2_-_Regular_Expressions.pptx
@@ -248,7 +248,7 @@
           <a:p>
             <a:fld id="{A8056B92-FCDB-4810-8779-64E0CAC2F787}" type="datetimeFigureOut">
               <a:rPr lang="pt-PT" smtClean="0"/>
-              <a:t>03/05/2018</a:t>
+              <a:t>04/05/2018</a:t>
             </a:fld>
             <a:endParaRPr lang="pt-PT"/>
           </a:p>
@@ -418,7 +418,7 @@
           <a:p>
             <a:fld id="{A8056B92-FCDB-4810-8779-64E0CAC2F787}" type="datetimeFigureOut">
               <a:rPr lang="pt-PT" smtClean="0"/>
-              <a:t>03/05/2018</a:t>
+              <a:t>04/05/2018</a:t>
             </a:fld>
             <a:endParaRPr lang="pt-PT"/>
           </a:p>
@@ -598,7 +598,7 @@
           <a:p>
             <a:fld id="{A8056B92-FCDB-4810-8779-64E0CAC2F787}" type="datetimeFigureOut">
               <a:rPr lang="pt-PT" smtClean="0"/>
-              <a:t>03/05/2018</a:t>
+              <a:t>04/05/2018</a:t>
             </a:fld>
             <a:endParaRPr lang="pt-PT"/>
           </a:p>
@@ -768,7 +768,7 @@
           <a:p>
             <a:fld id="{A8056B92-FCDB-4810-8779-64E0CAC2F787}" type="datetimeFigureOut">
               <a:rPr lang="pt-PT" smtClean="0"/>
-              <a:t>03/05/2018</a:t>
+              <a:t>04/05/2018</a:t>
             </a:fld>
             <a:endParaRPr lang="pt-PT"/>
           </a:p>
@@ -1014,7 +1014,7 @@
           <a:p>
             <a:fld id="{A8056B92-FCDB-4810-8779-64E0CAC2F787}" type="datetimeFigureOut">
               <a:rPr lang="pt-PT" smtClean="0"/>
-              <a:t>03/05/2018</a:t>
+              <a:t>04/05/2018</a:t>
             </a:fld>
             <a:endParaRPr lang="pt-PT"/>
           </a:p>
@@ -1246,7 +1246,7 @@
           <a:p>
             <a:fld id="{A8056B92-FCDB-4810-8779-64E0CAC2F787}" type="datetimeFigureOut">
               <a:rPr lang="pt-PT" smtClean="0"/>
-              <a:t>03/05/2018</a:t>
+              <a:t>04/05/2018</a:t>
             </a:fld>
             <a:endParaRPr lang="pt-PT"/>
           </a:p>
@@ -1613,7 +1613,7 @@
           <a:p>
             <a:fld id="{A8056B92-FCDB-4810-8779-64E0CAC2F787}" type="datetimeFigureOut">
               <a:rPr lang="pt-PT" smtClean="0"/>
-              <a:t>03/05/2018</a:t>
+              <a:t>04/05/2018</a:t>
             </a:fld>
             <a:endParaRPr lang="pt-PT"/>
           </a:p>
@@ -1731,7 +1731,7 @@
           <a:p>
             <a:fld id="{A8056B92-FCDB-4810-8779-64E0CAC2F787}" type="datetimeFigureOut">
               <a:rPr lang="pt-PT" smtClean="0"/>
-              <a:t>03/05/2018</a:t>
+              <a:t>04/05/2018</a:t>
             </a:fld>
             <a:endParaRPr lang="pt-PT"/>
           </a:p>
@@ -1826,7 +1826,7 @@
           <a:p>
             <a:fld id="{A8056B92-FCDB-4810-8779-64E0CAC2F787}" type="datetimeFigureOut">
               <a:rPr lang="pt-PT" smtClean="0"/>
-              <a:t>03/05/2018</a:t>
+              <a:t>04/05/2018</a:t>
             </a:fld>
             <a:endParaRPr lang="pt-PT"/>
           </a:p>
@@ -2103,7 +2103,7 @@
           <a:p>
             <a:fld id="{A8056B92-FCDB-4810-8779-64E0CAC2F787}" type="datetimeFigureOut">
               <a:rPr lang="pt-PT" smtClean="0"/>
-              <a:t>03/05/2018</a:t>
+              <a:t>04/05/2018</a:t>
             </a:fld>
             <a:endParaRPr lang="pt-PT"/>
           </a:p>
@@ -2360,7 +2360,7 @@
           <a:p>
             <a:fld id="{A8056B92-FCDB-4810-8779-64E0CAC2F787}" type="datetimeFigureOut">
               <a:rPr lang="pt-PT" smtClean="0"/>
-              <a:t>03/05/2018</a:t>
+              <a:t>04/05/2018</a:t>
             </a:fld>
             <a:endParaRPr lang="pt-PT"/>
           </a:p>
@@ -2573,7 +2573,7 @@
           <a:p>
             <a:fld id="{A8056B92-FCDB-4810-8779-64E0CAC2F787}" type="datetimeFigureOut">
               <a:rPr lang="pt-PT" smtClean="0"/>
-              <a:t>03/05/2018</a:t>
+              <a:t>04/05/2018</a:t>
             </a:fld>
             <a:endParaRPr lang="pt-PT"/>
           </a:p>
@@ -3035,11 +3035,14 @@
           <a:lstStyle/>
           <a:p>
             <a:r>
-              <a:rPr lang="pt-PT" dirty="0">
-                <a:latin typeface="Consolas" panose="020B0609020204030204" pitchFamily="49" charset="0"/>
-              </a:rPr>
-              <a:t>Semana 2</a:t>
-            </a:r>
+              <a:rPr lang="pt-PT">
+                <a:latin typeface="Consolas" panose="020B0609020204030204" pitchFamily="49" charset="0"/>
+              </a:rPr>
+              <a:t>Semana 1</a:t>
+            </a:r>
+            <a:endParaRPr lang="pt-PT" dirty="0">
+              <a:latin typeface="Consolas" panose="020B0609020204030204" pitchFamily="49" charset="0"/>
+            </a:endParaRPr>
           </a:p>
         </p:txBody>
       </p:sp>

</xml_diff>